<commit_message>
Completed lesson and exercise 2
</commit_message>
<xml_diff>
--- a/lessons/Lesson_1.pptx
+++ b/lessons/Lesson_1.pptx
@@ -8228,7 +8228,11 @@
             </a:pPr>
             <a:r>
               <a:rPr lang="en" dirty="0" smtClean="0"/>
-              <a:t>Exercise 1</a:t>
+              <a:t>Exercise </a:t>
+            </a:r>
+            <a:r>
+              <a:rPr lang="en" dirty="0" smtClean="0"/>
+              <a:t>1 part 1</a:t>
             </a:r>
             <a:endParaRPr lang="en" dirty="0"/>
           </a:p>
@@ -8556,7 +8560,11 @@
             </a:pPr>
             <a:r>
               <a:rPr lang="en" dirty="0" smtClean="0"/>
-              <a:t>Exercise 2</a:t>
+              <a:t>Exercise </a:t>
+            </a:r>
+            <a:r>
+              <a:rPr lang="en" dirty="0" smtClean="0"/>
+              <a:t>1 part 2</a:t>
             </a:r>
             <a:endParaRPr lang="en" dirty="0"/>
           </a:p>

</xml_diff>